<commit_message>
added master project foo
</commit_message>
<xml_diff>
--- a/Slide__pasler.pptx
+++ b/Slide__pasler.pptx
@@ -6,6 +6,8 @@
   </p:sldMasterIdLst>
   <p:sldIdLst>
     <p:sldId id="256" r:id="rId3"/>
+    <p:sldId id="257" r:id="rId4"/>
+    <p:sldId id="258" r:id="rId5"/>
   </p:sldIdLst>
   <p:sldSz cx="9144000" cy="6858000"/>
   <p:notesSz cx="7559675" cy="10691812"/>
@@ -53,7 +55,7 @@
       </p:grpSpPr>
       <p:sp>
         <p:nvSpPr>
-          <p:cNvPr id="30" name="PlaceHolder 1"/>
+          <p:cNvPr id="27" name="PlaceHolder 1"/>
           <p:cNvSpPr>
             <a:spLocks noGrp="1"/>
           </p:cNvSpPr>
@@ -63,8 +65,8 @@
         </p:nvSpPr>
         <p:spPr>
           <a:xfrm>
-            <a:off x="457200" y="274680"/>
-            <a:ext cx="8229240" cy="1143000"/>
+            <a:off x="457200" y="273600"/>
+            <a:ext cx="8229240" cy="1145160"/>
           </a:xfrm>
           <a:prstGeom prst="rect">
             <a:avLst/>
@@ -73,13 +75,14 @@
         <p:txBody>
           <a:bodyPr lIns="0" rIns="0" tIns="0" bIns="0" anchor="ctr"/>
           <a:p>
-            <a:endParaRPr/>
-          </a:p>
-        </p:txBody>
-      </p:sp>
-      <p:sp>
-        <p:nvSpPr>
-          <p:cNvPr id="31" name="PlaceHolder 2"/>
+            <a:pPr algn="ctr"/>
+            <a:endParaRPr/>
+          </a:p>
+        </p:txBody>
+      </p:sp>
+      <p:sp>
+        <p:nvSpPr>
+          <p:cNvPr id="28" name="PlaceHolder 2"/>
           <p:cNvSpPr>
             <a:spLocks noGrp="1"/>
           </p:cNvSpPr>
@@ -89,8 +92,8 @@
         </p:nvSpPr>
         <p:spPr>
           <a:xfrm>
-            <a:off x="457200" y="1600200"/>
-            <a:ext cx="8229240" cy="2158560"/>
+            <a:off x="457200" y="1604520"/>
+            <a:ext cx="8229240" cy="1896840"/>
           </a:xfrm>
           <a:prstGeom prst="rect">
             <a:avLst/>
@@ -105,7 +108,7 @@
       </p:sp>
       <p:sp>
         <p:nvSpPr>
-          <p:cNvPr id="32" name="PlaceHolder 3"/>
+          <p:cNvPr id="29" name="PlaceHolder 3"/>
           <p:cNvSpPr>
             <a:spLocks noGrp="1"/>
           </p:cNvSpPr>
@@ -115,8 +118,8 @@
         </p:nvSpPr>
         <p:spPr>
           <a:xfrm>
-            <a:off x="457200" y="3964320"/>
-            <a:ext cx="8229240" cy="2158560"/>
+            <a:off x="457200" y="3682080"/>
+            <a:ext cx="8229240" cy="1896840"/>
           </a:xfrm>
           <a:prstGeom prst="rect">
             <a:avLst/>
@@ -153,7 +156,7 @@
       </p:grpSpPr>
       <p:sp>
         <p:nvSpPr>
-          <p:cNvPr id="33" name="PlaceHolder 1"/>
+          <p:cNvPr id="30" name="PlaceHolder 1"/>
           <p:cNvSpPr>
             <a:spLocks noGrp="1"/>
           </p:cNvSpPr>
@@ -163,8 +166,8 @@
         </p:nvSpPr>
         <p:spPr>
           <a:xfrm>
-            <a:off x="457200" y="274680"/>
-            <a:ext cx="8229240" cy="1143000"/>
+            <a:off x="457200" y="273600"/>
+            <a:ext cx="8229240" cy="1145160"/>
           </a:xfrm>
           <a:prstGeom prst="rect">
             <a:avLst/>
@@ -173,13 +176,14 @@
         <p:txBody>
           <a:bodyPr lIns="0" rIns="0" tIns="0" bIns="0" anchor="ctr"/>
           <a:p>
-            <a:endParaRPr/>
-          </a:p>
-        </p:txBody>
-      </p:sp>
-      <p:sp>
-        <p:nvSpPr>
-          <p:cNvPr id="34" name="PlaceHolder 2"/>
+            <a:pPr algn="ctr"/>
+            <a:endParaRPr/>
+          </a:p>
+        </p:txBody>
+      </p:sp>
+      <p:sp>
+        <p:nvSpPr>
+          <p:cNvPr id="31" name="PlaceHolder 2"/>
           <p:cNvSpPr>
             <a:spLocks noGrp="1"/>
           </p:cNvSpPr>
@@ -189,8 +193,8 @@
         </p:nvSpPr>
         <p:spPr>
           <a:xfrm>
-            <a:off x="457200" y="1600200"/>
-            <a:ext cx="4015800" cy="2158560"/>
+            <a:off x="457200" y="1604520"/>
+            <a:ext cx="4015800" cy="1896840"/>
           </a:xfrm>
           <a:prstGeom prst="rect">
             <a:avLst/>
@@ -205,7 +209,7 @@
       </p:sp>
       <p:sp>
         <p:nvSpPr>
-          <p:cNvPr id="35" name="PlaceHolder 3"/>
+          <p:cNvPr id="32" name="PlaceHolder 3"/>
           <p:cNvSpPr>
             <a:spLocks noGrp="1"/>
           </p:cNvSpPr>
@@ -215,8 +219,8 @@
         </p:nvSpPr>
         <p:spPr>
           <a:xfrm>
-            <a:off x="4674240" y="1600200"/>
-            <a:ext cx="4015800" cy="2158560"/>
+            <a:off x="4674240" y="1604520"/>
+            <a:ext cx="4015800" cy="1896840"/>
           </a:xfrm>
           <a:prstGeom prst="rect">
             <a:avLst/>
@@ -231,7 +235,7 @@
       </p:sp>
       <p:sp>
         <p:nvSpPr>
-          <p:cNvPr id="36" name="PlaceHolder 4"/>
+          <p:cNvPr id="33" name="PlaceHolder 4"/>
           <p:cNvSpPr>
             <a:spLocks noGrp="1"/>
           </p:cNvSpPr>
@@ -241,8 +245,8 @@
         </p:nvSpPr>
         <p:spPr>
           <a:xfrm>
-            <a:off x="4674240" y="3964320"/>
-            <a:ext cx="4015800" cy="2158560"/>
+            <a:off x="4674240" y="3682080"/>
+            <a:ext cx="4015800" cy="1896840"/>
           </a:xfrm>
           <a:prstGeom prst="rect">
             <a:avLst/>
@@ -257,7 +261,7 @@
       </p:sp>
       <p:sp>
         <p:nvSpPr>
-          <p:cNvPr id="37" name="PlaceHolder 5"/>
+          <p:cNvPr id="34" name="PlaceHolder 5"/>
           <p:cNvSpPr>
             <a:spLocks noGrp="1"/>
           </p:cNvSpPr>
@@ -267,8 +271,8 @@
         </p:nvSpPr>
         <p:spPr>
           <a:xfrm>
-            <a:off x="457200" y="3964320"/>
-            <a:ext cx="4015800" cy="2158560"/>
+            <a:off x="457200" y="3682080"/>
+            <a:ext cx="4015800" cy="1896840"/>
           </a:xfrm>
           <a:prstGeom prst="rect">
             <a:avLst/>
@@ -305,7 +309,7 @@
       </p:grpSpPr>
       <p:sp>
         <p:nvSpPr>
-          <p:cNvPr id="38" name="PlaceHolder 1"/>
+          <p:cNvPr id="35" name="PlaceHolder 1"/>
           <p:cNvSpPr>
             <a:spLocks noGrp="1"/>
           </p:cNvSpPr>
@@ -315,8 +319,8 @@
         </p:nvSpPr>
         <p:spPr>
           <a:xfrm>
-            <a:off x="457200" y="274680"/>
-            <a:ext cx="8229240" cy="1143000"/>
+            <a:off x="457200" y="273600"/>
+            <a:ext cx="8229240" cy="1145160"/>
           </a:xfrm>
           <a:prstGeom prst="rect">
             <a:avLst/>
@@ -325,13 +329,14 @@
         <p:txBody>
           <a:bodyPr lIns="0" rIns="0" tIns="0" bIns="0" anchor="ctr"/>
           <a:p>
-            <a:endParaRPr/>
-          </a:p>
-        </p:txBody>
-      </p:sp>
-      <p:sp>
-        <p:nvSpPr>
-          <p:cNvPr id="39" name="PlaceHolder 2"/>
+            <a:pPr algn="ctr"/>
+            <a:endParaRPr/>
+          </a:p>
+        </p:txBody>
+      </p:sp>
+      <p:sp>
+        <p:nvSpPr>
+          <p:cNvPr id="36" name="PlaceHolder 2"/>
           <p:cNvSpPr>
             <a:spLocks noGrp="1"/>
           </p:cNvSpPr>
@@ -341,8 +346,8 @@
         </p:nvSpPr>
         <p:spPr>
           <a:xfrm>
-            <a:off x="457200" y="1600200"/>
-            <a:ext cx="8229240" cy="4525560"/>
+            <a:off x="457200" y="1604520"/>
+            <a:ext cx="8229240" cy="3977280"/>
           </a:xfrm>
           <a:prstGeom prst="rect">
             <a:avLst/>
@@ -357,7 +362,7 @@
       </p:sp>
       <p:sp>
         <p:nvSpPr>
-          <p:cNvPr id="40" name="PlaceHolder 3"/>
+          <p:cNvPr id="37" name="PlaceHolder 3"/>
           <p:cNvSpPr>
             <a:spLocks noGrp="1"/>
           </p:cNvSpPr>
@@ -367,8 +372,8 @@
         </p:nvSpPr>
         <p:spPr>
           <a:xfrm>
-            <a:off x="457200" y="1600200"/>
-            <a:ext cx="8229240" cy="4525560"/>
+            <a:off x="457200" y="1604520"/>
+            <a:ext cx="8229240" cy="3977280"/>
           </a:xfrm>
           <a:prstGeom prst="rect">
             <a:avLst/>
@@ -383,7 +388,7 @@
       </p:sp>
       <p:pic>
         <p:nvPicPr>
-          <p:cNvPr id="41" name="" descr=""/>
+          <p:cNvPr id="38" name="" descr=""/>
           <p:cNvPicPr/>
           <p:nvPr/>
         </p:nvPicPr>
@@ -395,8 +400,8 @@
         </p:blipFill>
         <p:spPr>
           <a:xfrm>
-            <a:off x="1735560" y="1599840"/>
-            <a:ext cx="5671800" cy="4525560"/>
+            <a:off x="2079000" y="1604520"/>
+            <a:ext cx="4984920" cy="3977280"/>
           </a:xfrm>
           <a:prstGeom prst="rect">
             <a:avLst/>
@@ -408,7 +413,7 @@
       </p:pic>
       <p:pic>
         <p:nvPicPr>
-          <p:cNvPr id="42" name="" descr=""/>
+          <p:cNvPr id="39" name="" descr=""/>
           <p:cNvPicPr/>
           <p:nvPr/>
         </p:nvPicPr>
@@ -420,8 +425,8 @@
         </p:blipFill>
         <p:spPr>
           <a:xfrm>
-            <a:off x="1735560" y="1599840"/>
-            <a:ext cx="5671800" cy="4525560"/>
+            <a:off x="2079000" y="1604520"/>
+            <a:ext cx="4984920" cy="3977280"/>
           </a:xfrm>
           <a:prstGeom prst="rect">
             <a:avLst/>
@@ -455,7 +460,7 @@
       </p:grpSpPr>
       <p:sp>
         <p:nvSpPr>
-          <p:cNvPr id="9" name="PlaceHolder 1"/>
+          <p:cNvPr id="6" name="PlaceHolder 1"/>
           <p:cNvSpPr>
             <a:spLocks noGrp="1"/>
           </p:cNvSpPr>
@@ -465,8 +470,8 @@
         </p:nvSpPr>
         <p:spPr>
           <a:xfrm>
-            <a:off x="457200" y="274680"/>
-            <a:ext cx="8229240" cy="1143000"/>
+            <a:off x="457200" y="273600"/>
+            <a:ext cx="8229240" cy="1145160"/>
           </a:xfrm>
           <a:prstGeom prst="rect">
             <a:avLst/>
@@ -475,13 +480,14 @@
         <p:txBody>
           <a:bodyPr lIns="0" rIns="0" tIns="0" bIns="0" anchor="ctr"/>
           <a:p>
-            <a:endParaRPr/>
-          </a:p>
-        </p:txBody>
-      </p:sp>
-      <p:sp>
-        <p:nvSpPr>
-          <p:cNvPr id="10" name="PlaceHolder 2"/>
+            <a:pPr algn="ctr"/>
+            <a:endParaRPr/>
+          </a:p>
+        </p:txBody>
+      </p:sp>
+      <p:sp>
+        <p:nvSpPr>
+          <p:cNvPr id="7" name="PlaceHolder 2"/>
           <p:cNvSpPr>
             <a:spLocks noGrp="1"/>
           </p:cNvSpPr>
@@ -491,8 +497,8 @@
         </p:nvSpPr>
         <p:spPr>
           <a:xfrm>
-            <a:off x="457200" y="1600200"/>
-            <a:ext cx="8229240" cy="4525920"/>
+            <a:off x="457200" y="1604520"/>
+            <a:ext cx="8229240" cy="3977640"/>
           </a:xfrm>
           <a:prstGeom prst="rect">
             <a:avLst/>
@@ -530,7 +536,7 @@
       </p:grpSpPr>
       <p:sp>
         <p:nvSpPr>
-          <p:cNvPr id="11" name="PlaceHolder 1"/>
+          <p:cNvPr id="8" name="PlaceHolder 1"/>
           <p:cNvSpPr>
             <a:spLocks noGrp="1"/>
           </p:cNvSpPr>
@@ -540,8 +546,8 @@
         </p:nvSpPr>
         <p:spPr>
           <a:xfrm>
-            <a:off x="457200" y="274680"/>
-            <a:ext cx="8229240" cy="1143000"/>
+            <a:off x="457200" y="273600"/>
+            <a:ext cx="8229240" cy="1145160"/>
           </a:xfrm>
           <a:prstGeom prst="rect">
             <a:avLst/>
@@ -550,13 +556,14 @@
         <p:txBody>
           <a:bodyPr lIns="0" rIns="0" tIns="0" bIns="0" anchor="ctr"/>
           <a:p>
-            <a:endParaRPr/>
-          </a:p>
-        </p:txBody>
-      </p:sp>
-      <p:sp>
-        <p:nvSpPr>
-          <p:cNvPr id="12" name="PlaceHolder 2"/>
+            <a:pPr algn="ctr"/>
+            <a:endParaRPr/>
+          </a:p>
+        </p:txBody>
+      </p:sp>
+      <p:sp>
+        <p:nvSpPr>
+          <p:cNvPr id="9" name="PlaceHolder 2"/>
           <p:cNvSpPr>
             <a:spLocks noGrp="1"/>
           </p:cNvSpPr>
@@ -566,8 +573,8 @@
         </p:nvSpPr>
         <p:spPr>
           <a:xfrm>
-            <a:off x="457200" y="1600200"/>
-            <a:ext cx="8229240" cy="4525560"/>
+            <a:off x="457200" y="1604520"/>
+            <a:ext cx="8229240" cy="3977280"/>
           </a:xfrm>
           <a:prstGeom prst="rect">
             <a:avLst/>
@@ -604,7 +611,7 @@
       </p:grpSpPr>
       <p:sp>
         <p:nvSpPr>
-          <p:cNvPr id="13" name="PlaceHolder 1"/>
+          <p:cNvPr id="10" name="PlaceHolder 1"/>
           <p:cNvSpPr>
             <a:spLocks noGrp="1"/>
           </p:cNvSpPr>
@@ -614,8 +621,8 @@
         </p:nvSpPr>
         <p:spPr>
           <a:xfrm>
-            <a:off x="457200" y="274680"/>
-            <a:ext cx="8229240" cy="1143000"/>
+            <a:off x="457200" y="273600"/>
+            <a:ext cx="8229240" cy="1145160"/>
           </a:xfrm>
           <a:prstGeom prst="rect">
             <a:avLst/>
@@ -624,13 +631,14 @@
         <p:txBody>
           <a:bodyPr lIns="0" rIns="0" tIns="0" bIns="0" anchor="ctr"/>
           <a:p>
-            <a:endParaRPr/>
-          </a:p>
-        </p:txBody>
-      </p:sp>
-      <p:sp>
-        <p:nvSpPr>
-          <p:cNvPr id="14" name="PlaceHolder 2"/>
+            <a:pPr algn="ctr"/>
+            <a:endParaRPr/>
+          </a:p>
+        </p:txBody>
+      </p:sp>
+      <p:sp>
+        <p:nvSpPr>
+          <p:cNvPr id="11" name="PlaceHolder 2"/>
           <p:cNvSpPr>
             <a:spLocks noGrp="1"/>
           </p:cNvSpPr>
@@ -640,8 +648,8 @@
         </p:nvSpPr>
         <p:spPr>
           <a:xfrm>
-            <a:off x="457200" y="1600200"/>
-            <a:ext cx="4015800" cy="4525560"/>
+            <a:off x="457200" y="1604520"/>
+            <a:ext cx="4015800" cy="3977280"/>
           </a:xfrm>
           <a:prstGeom prst="rect">
             <a:avLst/>
@@ -656,7 +664,7 @@
       </p:sp>
       <p:sp>
         <p:nvSpPr>
-          <p:cNvPr id="15" name="PlaceHolder 3"/>
+          <p:cNvPr id="12" name="PlaceHolder 3"/>
           <p:cNvSpPr>
             <a:spLocks noGrp="1"/>
           </p:cNvSpPr>
@@ -666,8 +674,8 @@
         </p:nvSpPr>
         <p:spPr>
           <a:xfrm>
-            <a:off x="4674240" y="1600200"/>
-            <a:ext cx="4015800" cy="4525560"/>
+            <a:off x="4674240" y="1604520"/>
+            <a:ext cx="4015800" cy="3977280"/>
           </a:xfrm>
           <a:prstGeom prst="rect">
             <a:avLst/>
@@ -704,7 +712,7 @@
       </p:grpSpPr>
       <p:sp>
         <p:nvSpPr>
-          <p:cNvPr id="16" name="PlaceHolder 1"/>
+          <p:cNvPr id="13" name="PlaceHolder 1"/>
           <p:cNvSpPr>
             <a:spLocks noGrp="1"/>
           </p:cNvSpPr>
@@ -714,8 +722,8 @@
         </p:nvSpPr>
         <p:spPr>
           <a:xfrm>
-            <a:off x="457200" y="274680"/>
-            <a:ext cx="8229240" cy="1143000"/>
+            <a:off x="457200" y="273600"/>
+            <a:ext cx="8229240" cy="1145160"/>
           </a:xfrm>
           <a:prstGeom prst="rect">
             <a:avLst/>
@@ -724,6 +732,7 @@
         <p:txBody>
           <a:bodyPr lIns="0" rIns="0" tIns="0" bIns="0" anchor="ctr"/>
           <a:p>
+            <a:pPr algn="ctr"/>
             <a:endParaRPr/>
           </a:p>
         </p:txBody>
@@ -752,7 +761,7 @@
       </p:grpSpPr>
       <p:sp>
         <p:nvSpPr>
-          <p:cNvPr id="17" name="PlaceHolder 1"/>
+          <p:cNvPr id="14" name="PlaceHolder 1"/>
           <p:cNvSpPr>
             <a:spLocks noGrp="1"/>
           </p:cNvSpPr>
@@ -762,8 +771,8 @@
         </p:nvSpPr>
         <p:spPr>
           <a:xfrm>
-            <a:off x="457200" y="274680"/>
-            <a:ext cx="8229240" cy="5298120"/>
+            <a:off x="457200" y="273600"/>
+            <a:ext cx="8229240" cy="5308200"/>
           </a:xfrm>
           <a:prstGeom prst="rect">
             <a:avLst/>
@@ -801,7 +810,7 @@
       </p:grpSpPr>
       <p:sp>
         <p:nvSpPr>
-          <p:cNvPr id="18" name="PlaceHolder 1"/>
+          <p:cNvPr id="15" name="PlaceHolder 1"/>
           <p:cNvSpPr>
             <a:spLocks noGrp="1"/>
           </p:cNvSpPr>
@@ -811,8 +820,8 @@
         </p:nvSpPr>
         <p:spPr>
           <a:xfrm>
-            <a:off x="457200" y="274680"/>
-            <a:ext cx="8229240" cy="1143000"/>
+            <a:off x="457200" y="273600"/>
+            <a:ext cx="8229240" cy="1145160"/>
           </a:xfrm>
           <a:prstGeom prst="rect">
             <a:avLst/>
@@ -821,13 +830,14 @@
         <p:txBody>
           <a:bodyPr lIns="0" rIns="0" tIns="0" bIns="0" anchor="ctr"/>
           <a:p>
-            <a:endParaRPr/>
-          </a:p>
-        </p:txBody>
-      </p:sp>
-      <p:sp>
-        <p:nvSpPr>
-          <p:cNvPr id="19" name="PlaceHolder 2"/>
+            <a:pPr algn="ctr"/>
+            <a:endParaRPr/>
+          </a:p>
+        </p:txBody>
+      </p:sp>
+      <p:sp>
+        <p:nvSpPr>
+          <p:cNvPr id="16" name="PlaceHolder 2"/>
           <p:cNvSpPr>
             <a:spLocks noGrp="1"/>
           </p:cNvSpPr>
@@ -837,8 +847,8 @@
         </p:nvSpPr>
         <p:spPr>
           <a:xfrm>
-            <a:off x="457200" y="1600200"/>
-            <a:ext cx="4015800" cy="2158560"/>
+            <a:off x="457200" y="1604520"/>
+            <a:ext cx="4015800" cy="1896840"/>
           </a:xfrm>
           <a:prstGeom prst="rect">
             <a:avLst/>
@@ -853,7 +863,7 @@
       </p:sp>
       <p:sp>
         <p:nvSpPr>
-          <p:cNvPr id="20" name="PlaceHolder 3"/>
+          <p:cNvPr id="17" name="PlaceHolder 3"/>
           <p:cNvSpPr>
             <a:spLocks noGrp="1"/>
           </p:cNvSpPr>
@@ -863,8 +873,8 @@
         </p:nvSpPr>
         <p:spPr>
           <a:xfrm>
-            <a:off x="457200" y="3964320"/>
-            <a:ext cx="4015800" cy="2158560"/>
+            <a:off x="457200" y="3682080"/>
+            <a:ext cx="4015800" cy="1896840"/>
           </a:xfrm>
           <a:prstGeom prst="rect">
             <a:avLst/>
@@ -879,7 +889,7 @@
       </p:sp>
       <p:sp>
         <p:nvSpPr>
-          <p:cNvPr id="21" name="PlaceHolder 4"/>
+          <p:cNvPr id="18" name="PlaceHolder 4"/>
           <p:cNvSpPr>
             <a:spLocks noGrp="1"/>
           </p:cNvSpPr>
@@ -889,8 +899,8 @@
         </p:nvSpPr>
         <p:spPr>
           <a:xfrm>
-            <a:off x="4674240" y="1600200"/>
-            <a:ext cx="4015800" cy="4525560"/>
+            <a:off x="4674240" y="1604520"/>
+            <a:ext cx="4015800" cy="3977280"/>
           </a:xfrm>
           <a:prstGeom prst="rect">
             <a:avLst/>
@@ -927,7 +937,7 @@
       </p:grpSpPr>
       <p:sp>
         <p:nvSpPr>
-          <p:cNvPr id="22" name="PlaceHolder 1"/>
+          <p:cNvPr id="19" name="PlaceHolder 1"/>
           <p:cNvSpPr>
             <a:spLocks noGrp="1"/>
           </p:cNvSpPr>
@@ -937,8 +947,8 @@
         </p:nvSpPr>
         <p:spPr>
           <a:xfrm>
-            <a:off x="457200" y="274680"/>
-            <a:ext cx="8229240" cy="1143000"/>
+            <a:off x="457200" y="273600"/>
+            <a:ext cx="8229240" cy="1145160"/>
           </a:xfrm>
           <a:prstGeom prst="rect">
             <a:avLst/>
@@ -947,13 +957,14 @@
         <p:txBody>
           <a:bodyPr lIns="0" rIns="0" tIns="0" bIns="0" anchor="ctr"/>
           <a:p>
-            <a:endParaRPr/>
-          </a:p>
-        </p:txBody>
-      </p:sp>
-      <p:sp>
-        <p:nvSpPr>
-          <p:cNvPr id="23" name="PlaceHolder 2"/>
+            <a:pPr algn="ctr"/>
+            <a:endParaRPr/>
+          </a:p>
+        </p:txBody>
+      </p:sp>
+      <p:sp>
+        <p:nvSpPr>
+          <p:cNvPr id="20" name="PlaceHolder 2"/>
           <p:cNvSpPr>
             <a:spLocks noGrp="1"/>
           </p:cNvSpPr>
@@ -963,8 +974,8 @@
         </p:nvSpPr>
         <p:spPr>
           <a:xfrm>
-            <a:off x="457200" y="1600200"/>
-            <a:ext cx="4015800" cy="4525560"/>
+            <a:off x="457200" y="1604520"/>
+            <a:ext cx="4015800" cy="3977280"/>
           </a:xfrm>
           <a:prstGeom prst="rect">
             <a:avLst/>
@@ -979,7 +990,7 @@
       </p:sp>
       <p:sp>
         <p:nvSpPr>
-          <p:cNvPr id="24" name="PlaceHolder 3"/>
+          <p:cNvPr id="21" name="PlaceHolder 3"/>
           <p:cNvSpPr>
             <a:spLocks noGrp="1"/>
           </p:cNvSpPr>
@@ -989,8 +1000,8 @@
         </p:nvSpPr>
         <p:spPr>
           <a:xfrm>
-            <a:off x="4674240" y="1600200"/>
-            <a:ext cx="4015800" cy="2158560"/>
+            <a:off x="4674240" y="1604520"/>
+            <a:ext cx="4015800" cy="1896840"/>
           </a:xfrm>
           <a:prstGeom prst="rect">
             <a:avLst/>
@@ -1005,7 +1016,7 @@
       </p:sp>
       <p:sp>
         <p:nvSpPr>
-          <p:cNvPr id="25" name="PlaceHolder 4"/>
+          <p:cNvPr id="22" name="PlaceHolder 4"/>
           <p:cNvSpPr>
             <a:spLocks noGrp="1"/>
           </p:cNvSpPr>
@@ -1015,8 +1026,8 @@
         </p:nvSpPr>
         <p:spPr>
           <a:xfrm>
-            <a:off x="4674240" y="3964320"/>
-            <a:ext cx="4015800" cy="2158560"/>
+            <a:off x="4674240" y="3682080"/>
+            <a:ext cx="4015800" cy="1896840"/>
           </a:xfrm>
           <a:prstGeom prst="rect">
             <a:avLst/>
@@ -1053,7 +1064,7 @@
       </p:grpSpPr>
       <p:sp>
         <p:nvSpPr>
-          <p:cNvPr id="26" name="PlaceHolder 1"/>
+          <p:cNvPr id="23" name="PlaceHolder 1"/>
           <p:cNvSpPr>
             <a:spLocks noGrp="1"/>
           </p:cNvSpPr>
@@ -1063,8 +1074,8 @@
         </p:nvSpPr>
         <p:spPr>
           <a:xfrm>
-            <a:off x="457200" y="274680"/>
-            <a:ext cx="8229240" cy="1143000"/>
+            <a:off x="457200" y="273600"/>
+            <a:ext cx="8229240" cy="1145160"/>
           </a:xfrm>
           <a:prstGeom prst="rect">
             <a:avLst/>
@@ -1073,13 +1084,14 @@
         <p:txBody>
           <a:bodyPr lIns="0" rIns="0" tIns="0" bIns="0" anchor="ctr"/>
           <a:p>
-            <a:endParaRPr/>
-          </a:p>
-        </p:txBody>
-      </p:sp>
-      <p:sp>
-        <p:nvSpPr>
-          <p:cNvPr id="27" name="PlaceHolder 2"/>
+            <a:pPr algn="ctr"/>
+            <a:endParaRPr/>
+          </a:p>
+        </p:txBody>
+      </p:sp>
+      <p:sp>
+        <p:nvSpPr>
+          <p:cNvPr id="24" name="PlaceHolder 2"/>
           <p:cNvSpPr>
             <a:spLocks noGrp="1"/>
           </p:cNvSpPr>
@@ -1089,8 +1101,8 @@
         </p:nvSpPr>
         <p:spPr>
           <a:xfrm>
-            <a:off x="457200" y="1600200"/>
-            <a:ext cx="4015800" cy="2158560"/>
+            <a:off x="457200" y="1604520"/>
+            <a:ext cx="4015800" cy="1896840"/>
           </a:xfrm>
           <a:prstGeom prst="rect">
             <a:avLst/>
@@ -1105,7 +1117,7 @@
       </p:sp>
       <p:sp>
         <p:nvSpPr>
-          <p:cNvPr id="28" name="PlaceHolder 3"/>
+          <p:cNvPr id="25" name="PlaceHolder 3"/>
           <p:cNvSpPr>
             <a:spLocks noGrp="1"/>
           </p:cNvSpPr>
@@ -1115,8 +1127,8 @@
         </p:nvSpPr>
         <p:spPr>
           <a:xfrm>
-            <a:off x="4674240" y="1600200"/>
-            <a:ext cx="4015800" cy="2158560"/>
+            <a:off x="4674240" y="1604520"/>
+            <a:ext cx="4015800" cy="1896840"/>
           </a:xfrm>
           <a:prstGeom prst="rect">
             <a:avLst/>
@@ -1131,7 +1143,7 @@
       </p:sp>
       <p:sp>
         <p:nvSpPr>
-          <p:cNvPr id="29" name="PlaceHolder 4"/>
+          <p:cNvPr id="26" name="PlaceHolder 4"/>
           <p:cNvSpPr>
             <a:spLocks noGrp="1"/>
           </p:cNvSpPr>
@@ -1141,8 +1153,8 @@
         </p:nvSpPr>
         <p:spPr>
           <a:xfrm>
-            <a:off x="457200" y="3964320"/>
-            <a:ext cx="8229240" cy="2158560"/>
+            <a:off x="457200" y="3682080"/>
+            <a:ext cx="8229240" cy="1896840"/>
           </a:xfrm>
           <a:prstGeom prst="rect">
             <a:avLst/>
@@ -1199,7 +1211,7 @@
         <p:spPr>
           <a:xfrm>
             <a:off x="0" y="6526800"/>
-            <a:ext cx="9143640" cy="358200"/>
+            <a:ext cx="9143280" cy="357840"/>
           </a:xfrm>
           <a:prstGeom prst="rect">
             <a:avLst/>
@@ -1224,7 +1236,7 @@
         <p:spPr>
           <a:xfrm>
             <a:off x="7302600" y="6352920"/>
-            <a:ext cx="1439640" cy="347760"/>
+            <a:ext cx="1439280" cy="347400"/>
           </a:xfrm>
           <a:prstGeom prst="rect">
             <a:avLst/>
@@ -1249,7 +1261,7 @@
         <p:spPr>
           <a:xfrm>
             <a:off x="7302600" y="210240"/>
-            <a:ext cx="1439640" cy="597600"/>
+            <a:ext cx="1439280" cy="597240"/>
           </a:xfrm>
           <a:prstGeom prst="rect">
             <a:avLst/>
@@ -1274,7 +1286,7 @@
         <p:spPr>
           <a:xfrm>
             <a:off x="306000" y="204840"/>
-            <a:ext cx="1495080" cy="800280"/>
+            <a:ext cx="1494720" cy="799920"/>
           </a:xfrm>
           <a:prstGeom prst="rect">
             <a:avLst/>
@@ -1296,29 +1308,22 @@
         </p:nvSpPr>
         <p:spPr>
           <a:xfrm>
-            <a:off x="457200" y="274680"/>
-            <a:ext cx="8229240" cy="1142640"/>
-          </a:xfrm>
-          <a:prstGeom prst="rect">
-            <a:avLst/>
-          </a:prstGeom>
-        </p:spPr>
-        <p:txBody>
-          <a:bodyPr lIns="90000" rIns="90000" tIns="45000" bIns="45000"/>
-          <a:p>
-            <a:pPr algn="ctr">
-              <a:lnSpc>
-                <a:spcPct val="100000"/>
-              </a:lnSpc>
-            </a:pPr>
+            <a:off x="457200" y="273600"/>
+            <a:ext cx="8229240" cy="1144800"/>
+          </a:xfrm>
+          <a:prstGeom prst="rect">
+            <a:avLst/>
+          </a:prstGeom>
+        </p:spPr>
+        <p:txBody>
+          <a:bodyPr lIns="0" rIns="0" tIns="0" bIns="0" anchor="ctr"/>
+          <a:p>
+            <a:pPr algn="ctr"/>
             <a:r>
               <a:rPr lang="de-DE" sz="4400">
-                <a:solidFill>
-                  <a:srgbClr val="000000"/>
-                </a:solidFill>
-                <a:latin typeface="Calibri"/>
-              </a:rPr>
-              <a:t>Klicken Sie, um das Format des Titeltextes zu bearbeitenMastertitelformat bearbeiten</a:t>
+                <a:latin typeface="Arial"/>
+              </a:rPr>
+              <a:t>Klicken Sie, um das Format des Titeltextes zu bearbeiten</a:t>
             </a:r>
             <a:endParaRPr/>
           </a:p>
@@ -1336,15 +1341,15 @@
         </p:nvSpPr>
         <p:spPr>
           <a:xfrm>
-            <a:off x="457200" y="1600200"/>
-            <a:ext cx="8229240" cy="4525560"/>
-          </a:xfrm>
-          <a:prstGeom prst="rect">
-            <a:avLst/>
-          </a:prstGeom>
-        </p:spPr>
-        <p:txBody>
-          <a:bodyPr lIns="90000" rIns="90000" tIns="45000" bIns="45000"/>
+            <a:off x="457200" y="1604520"/>
+            <a:ext cx="8229240" cy="3977280"/>
+          </a:xfrm>
+          <a:prstGeom prst="rect">
+            <a:avLst/>
+          </a:prstGeom>
+        </p:spPr>
+        <p:txBody>
+          <a:bodyPr lIns="0" rIns="0" tIns="0" bIns="0"/>
           <a:p>
             <a:pPr>
               <a:buSzPct val="45000"/>
@@ -1353,10 +1358,7 @@
             </a:pPr>
             <a:r>
               <a:rPr lang="de-DE" sz="3200">
-                <a:solidFill>
-                  <a:srgbClr val="000000"/>
-                </a:solidFill>
-                <a:latin typeface="Calibri"/>
+                <a:latin typeface="Arial"/>
               </a:rPr>
               <a:t>Klicken Sie, um die Formate des Gliederungstextes zu bearbeiten</a:t>
             </a:r>
@@ -1369,11 +1371,8 @@
               <a:buChar char=""/>
             </a:pPr>
             <a:r>
-              <a:rPr lang="de-DE" sz="3200">
-                <a:solidFill>
-                  <a:srgbClr val="000000"/>
-                </a:solidFill>
-                <a:latin typeface="Calibri"/>
+              <a:rPr lang="de-DE" sz="2800">
+                <a:latin typeface="Arial"/>
               </a:rPr>
               <a:t>Zweite Gliederungsebene</a:t>
             </a:r>
@@ -1386,11 +1385,8 @@
               <a:buChar char=""/>
             </a:pPr>
             <a:r>
-              <a:rPr lang="de-DE" sz="3200">
-                <a:solidFill>
-                  <a:srgbClr val="000000"/>
-                </a:solidFill>
-                <a:latin typeface="Calibri"/>
+              <a:rPr lang="de-DE" sz="2400">
+                <a:latin typeface="Arial"/>
               </a:rPr>
               <a:t>Dritte Gliederungsebene</a:t>
             </a:r>
@@ -1403,11 +1399,8 @@
               <a:buChar char=""/>
             </a:pPr>
             <a:r>
-              <a:rPr lang="de-DE" sz="3200">
-                <a:solidFill>
-                  <a:srgbClr val="000000"/>
-                </a:solidFill>
-                <a:latin typeface="Calibri"/>
+              <a:rPr lang="de-DE" sz="2000">
+                <a:latin typeface="Arial"/>
               </a:rPr>
               <a:t>Vierte Gliederungsebene</a:t>
             </a:r>
@@ -1420,11 +1413,8 @@
               <a:buChar char=""/>
             </a:pPr>
             <a:r>
-              <a:rPr lang="de-DE" sz="3200">
-                <a:solidFill>
-                  <a:srgbClr val="000000"/>
-                </a:solidFill>
-                <a:latin typeface="Calibri"/>
+              <a:rPr lang="de-DE" sz="2000">
+                <a:latin typeface="Arial"/>
               </a:rPr>
               <a:t>Fünfte Gliederungsebene</a:t>
             </a:r>
@@ -1437,215 +1427,25 @@
               <a:buChar char=""/>
             </a:pPr>
             <a:r>
-              <a:rPr lang="de-DE" sz="3200">
-                <a:solidFill>
-                  <a:srgbClr val="000000"/>
-                </a:solidFill>
-                <a:latin typeface="Calibri"/>
+              <a:rPr lang="de-DE" sz="2000">
+                <a:latin typeface="Arial"/>
               </a:rPr>
               <a:t>Sechste Gliederungsebene</a:t>
             </a:r>
             <a:endParaRPr/>
           </a:p>
           <a:p>
-            <a:pPr>
-              <a:lnSpc>
-                <a:spcPct val="100000"/>
-              </a:lnSpc>
-              <a:buFont typeface="Arial"/>
-              <a:buChar char="•"/>
+            <a:pPr lvl="6">
+              <a:buSzPct val="45000"/>
+              <a:buFont typeface="StarSymbol"/>
+              <a:buChar char=""/>
             </a:pPr>
             <a:r>
-              <a:rPr lang="de-DE" sz="3200">
-                <a:solidFill>
-                  <a:srgbClr val="000000"/>
-                </a:solidFill>
-                <a:latin typeface="Calibri"/>
-              </a:rPr>
-              <a:t>Siebente GliederungsebeneMastertextformat bearbeiten</a:t>
-            </a:r>
-            <a:endParaRPr/>
-          </a:p>
-          <a:p>
-            <a:pPr lvl="1">
-              <a:lnSpc>
-                <a:spcPct val="100000"/>
-              </a:lnSpc>
-              <a:buFont typeface="Arial"/>
-              <a:buChar char="–"/>
-            </a:pPr>
-            <a:r>
-              <a:rPr lang="de-DE" sz="2800">
-                <a:solidFill>
-                  <a:srgbClr val="000000"/>
-                </a:solidFill>
-                <a:latin typeface="Calibri"/>
-              </a:rPr>
-              <a:t>Zweite Ebene</a:t>
-            </a:r>
-            <a:endParaRPr/>
-          </a:p>
-          <a:p>
-            <a:pPr lvl="2">
-              <a:lnSpc>
-                <a:spcPct val="100000"/>
-              </a:lnSpc>
-              <a:buFont typeface="Arial"/>
-              <a:buChar char="•"/>
-            </a:pPr>
-            <a:r>
-              <a:rPr lang="de-DE" sz="2400">
-                <a:solidFill>
-                  <a:srgbClr val="000000"/>
-                </a:solidFill>
-                <a:latin typeface="Calibri"/>
-              </a:rPr>
-              <a:t>Dritte Ebene</a:t>
-            </a:r>
-            <a:endParaRPr/>
-          </a:p>
-          <a:p>
-            <a:pPr lvl="3">
-              <a:lnSpc>
-                <a:spcPct val="100000"/>
-              </a:lnSpc>
-              <a:buFont typeface="Arial"/>
-              <a:buChar char="–"/>
-            </a:pPr>
-            <a:r>
               <a:rPr lang="de-DE" sz="2000">
-                <a:solidFill>
-                  <a:srgbClr val="000000"/>
-                </a:solidFill>
-                <a:latin typeface="Calibri"/>
-              </a:rPr>
-              <a:t>Vierte Ebene</a:t>
-            </a:r>
-            <a:endParaRPr/>
-          </a:p>
-          <a:p>
-            <a:pPr lvl="4">
-              <a:lnSpc>
-                <a:spcPct val="100000"/>
-              </a:lnSpc>
-              <a:buFont typeface="Arial"/>
-              <a:buChar char="»"/>
-            </a:pPr>
-            <a:r>
-              <a:rPr lang="de-DE" sz="2000">
-                <a:solidFill>
-                  <a:srgbClr val="000000"/>
-                </a:solidFill>
-                <a:latin typeface="Calibri"/>
-              </a:rPr>
-              <a:t>Fünfte Ebene</a:t>
-            </a:r>
-            <a:endParaRPr/>
-          </a:p>
-        </p:txBody>
-      </p:sp>
-      <p:sp>
-        <p:nvSpPr>
-          <p:cNvPr id="6" name="PlaceHolder 3"/>
-          <p:cNvSpPr>
-            <a:spLocks noGrp="1"/>
-          </p:cNvSpPr>
-          <p:nvPr>
-            <p:ph type="dt"/>
-          </p:nvPr>
-        </p:nvSpPr>
-        <p:spPr>
-          <a:xfrm>
-            <a:off x="457200" y="6356520"/>
-            <a:ext cx="2133360" cy="364680"/>
-          </a:xfrm>
-          <a:prstGeom prst="rect">
-            <a:avLst/>
-          </a:prstGeom>
-        </p:spPr>
-        <p:txBody>
-          <a:bodyPr lIns="90000" rIns="90000" tIns="45000" bIns="45000"/>
-          <a:p>
-            <a:pPr>
-              <a:lnSpc>
-                <a:spcPct val="100000"/>
-              </a:lnSpc>
-            </a:pPr>
-            <a:r>
-              <a:rPr lang="de-DE">
-                <a:solidFill>
-                  <a:srgbClr val="000000"/>
-                </a:solidFill>
-                <a:latin typeface="Calibri"/>
-              </a:rPr>
-              <a:t>16.11.15</a:t>
-            </a:r>
-            <a:endParaRPr/>
-          </a:p>
-        </p:txBody>
-      </p:sp>
-      <p:sp>
-        <p:nvSpPr>
-          <p:cNvPr id="7" name="PlaceHolder 4"/>
-          <p:cNvSpPr>
-            <a:spLocks noGrp="1"/>
-          </p:cNvSpPr>
-          <p:nvPr>
-            <p:ph type="ftr"/>
-          </p:nvPr>
-        </p:nvSpPr>
-        <p:spPr>
-          <a:xfrm>
-            <a:off x="3124080" y="6356520"/>
-            <a:ext cx="2895120" cy="364680"/>
-          </a:xfrm>
-          <a:prstGeom prst="rect">
-            <a:avLst/>
-          </a:prstGeom>
-        </p:spPr>
-        <p:txBody>
-          <a:bodyPr lIns="90000" rIns="90000" tIns="45000" bIns="45000"/>
-          <a:p>
-            <a:endParaRPr/>
-          </a:p>
-        </p:txBody>
-      </p:sp>
-      <p:sp>
-        <p:nvSpPr>
-          <p:cNvPr id="8" name="PlaceHolder 5"/>
-          <p:cNvSpPr>
-            <a:spLocks noGrp="1"/>
-          </p:cNvSpPr>
-          <p:nvPr>
-            <p:ph type="sldNum"/>
-          </p:nvPr>
-        </p:nvSpPr>
-        <p:spPr>
-          <a:xfrm>
-            <a:off x="6553080" y="6343200"/>
-            <a:ext cx="2133360" cy="364680"/>
-          </a:xfrm>
-          <a:prstGeom prst="rect">
-            <a:avLst/>
-          </a:prstGeom>
-        </p:spPr>
-        <p:txBody>
-          <a:bodyPr lIns="90000" rIns="90000" tIns="45000" bIns="45000"/>
-          <a:p>
-            <a:pPr>
-              <a:lnSpc>
-                <a:spcPct val="100000"/>
-              </a:lnSpc>
-            </a:pPr>
-            <a:fld id="{743D1AE4-99D3-428D-8567-BE49A3F5551D}" type="slidenum">
-              <a:rPr lang="de-DE">
-                <a:solidFill>
-                  <a:srgbClr val="000000"/>
-                </a:solidFill>
-                <a:latin typeface="Calibri"/>
-              </a:rPr>
-              <a:t>&lt;Nummer&gt;</a:t>
-            </a:fld>
+                <a:latin typeface="Arial"/>
+              </a:rPr>
+              <a:t>Siebente Gliederungsebene</a:t>
+            </a:r>
             <a:endParaRPr/>
           </a:p>
         </p:txBody>
@@ -1689,7 +1489,7 @@
       </p:grpSpPr>
       <p:pic>
         <p:nvPicPr>
-          <p:cNvPr id="43" name="Bild 9" descr=""/>
+          <p:cNvPr id="40" name="Bild 9" descr=""/>
           <p:cNvPicPr/>
           <p:nvPr/>
         </p:nvPicPr>
@@ -1702,7 +1502,7 @@
         <p:spPr>
           <a:xfrm>
             <a:off x="179280" y="82800"/>
-            <a:ext cx="4966560" cy="6184800"/>
+            <a:ext cx="4966200" cy="6184440"/>
           </a:xfrm>
           <a:prstGeom prst="rect">
             <a:avLst/>
@@ -1714,14 +1514,14 @@
       </p:pic>
       <p:sp>
         <p:nvSpPr>
-          <p:cNvPr id="44" name="CustomShape 1"/>
+          <p:cNvPr id="41" name="CustomShape 1"/>
           <p:cNvSpPr/>
           <p:nvPr/>
         </p:nvSpPr>
         <p:spPr>
           <a:xfrm>
             <a:off x="102600" y="1099800"/>
-            <a:ext cx="8819280" cy="628560"/>
+            <a:ext cx="8818920" cy="628200"/>
           </a:xfrm>
           <a:prstGeom prst="rect">
             <a:avLst/>
@@ -1766,14 +1566,14 @@
       </p:sp>
       <p:sp>
         <p:nvSpPr>
-          <p:cNvPr id="45" name="CustomShape 2"/>
+          <p:cNvPr id="42" name="CustomShape 2"/>
           <p:cNvSpPr/>
           <p:nvPr/>
         </p:nvSpPr>
         <p:spPr>
           <a:xfrm>
             <a:off x="192600" y="1815840"/>
-            <a:ext cx="4349160" cy="3740760"/>
+            <a:ext cx="4348800" cy="3740400"/>
           </a:xfrm>
           <a:prstGeom prst="rect">
             <a:avLst/>
@@ -1783,139 +1583,23 @@
             <a:noFill/>
           </a:ln>
         </p:spPr>
-        <p:txBody>
-          <a:bodyPr lIns="90000" rIns="90000" tIns="45000" bIns="45000"/>
-          <a:p>
-            <a:pPr>
-              <a:buBlip>
-                <a:blip r:embed="rId2"/>
-              </a:buBlip>
-            </a:pPr>
-            <a:r>
-              <a:rPr lang="de-DE" sz="1200">
-                <a:solidFill>
-                  <a:srgbClr val="000000"/>
-                </a:solidFill>
-                <a:latin typeface="Calibri"/>
-              </a:rPr>
-              <a:t>Jeder 5. Unfall lässt sich auf Müdigkeit zurückführen [EVE08]</a:t>
-            </a:r>
-            <a:endParaRPr/>
-          </a:p>
-          <a:p>
-            <a:pPr>
-              <a:buSzPct val="45000"/>
-              <a:buFont typeface="StarSymbol"/>
-              <a:buChar char=""/>
-            </a:pPr>
-            <a:r>
-              <a:rPr lang="de-DE" sz="1200">
-                <a:solidFill>
-                  <a:srgbClr val="000000"/>
-                </a:solidFill>
-                <a:latin typeface="Calibri"/>
-              </a:rPr>
-              <a:t>Der flächendeckende Einsatz von Fahrerassistenzsystemen könnte die Zahl schwerer Unfälle um bis zu 28% verringern [MAA15]</a:t>
-            </a:r>
-            <a:endParaRPr/>
-          </a:p>
-          <a:p>
-            <a:pPr>
-              <a:buSzPct val="45000"/>
-              <a:buFont typeface="StarSymbol"/>
-              <a:buChar char=""/>
-            </a:pPr>
-            <a:r>
-              <a:rPr lang="de-DE" sz="1200">
-                <a:solidFill>
-                  <a:srgbClr val="000000"/>
-                </a:solidFill>
-                <a:latin typeface="Calibri"/>
-              </a:rPr>
-              <a:t>Die Hälfte der Befragten ist schon einmal übermüdet gefahren, jeder 3. sogar schon kurz</a:t>
-            </a:r>
-            <a:r>
-              <a:rPr lang="de-DE" sz="1200">
-                <a:solidFill>
-                  <a:srgbClr val="ffffff"/>
-                </a:solidFill>
-                <a:latin typeface="Calibri"/>
-              </a:rPr>
-              <a:t> </a:t>
-            </a:r>
-            <a:r>
-              <a:rPr lang="de-DE" sz="1200">
-                <a:solidFill>
-                  <a:srgbClr val="333333"/>
-                </a:solidFill>
-                <a:latin typeface="Calibri"/>
-                <a:ea typeface="ArialMT"/>
-              </a:rPr>
-              <a:t>eingeschlafen [NSF10]</a:t>
-            </a:r>
-            <a:endParaRPr/>
-          </a:p>
-          <a:p>
-            <a:endParaRPr/>
-          </a:p>
-          <a:p>
-            <a:r>
-              <a:rPr b="1" lang="de-DE" sz="1200">
-                <a:solidFill>
-                  <a:srgbClr val="000000"/>
-                </a:solidFill>
-                <a:latin typeface="Calibri"/>
-                <a:ea typeface="ArialMT"/>
-              </a:rPr>
-              <a:t>Systeme zur Müdigkeitserkennung raten dem Fahrer rechtzeitig eine Pause einzulegen und helfen, schwere Unfälle zu vermeiden.</a:t>
-            </a:r>
-            <a:endParaRPr/>
-          </a:p>
-          <a:p>
-            <a:endParaRPr/>
-          </a:p>
-          <a:p>
-            <a:r>
-              <a:rPr lang="de-DE" sz="1200">
-                <a:solidFill>
-                  <a:srgbClr val="000000"/>
-                </a:solidFill>
-                <a:latin typeface="Calibri"/>
-              </a:rPr>
-              <a:t>Lösungen mit Body-Sensoren liefert sehr gute Ergebnisse, scheitern aber in der Praxis häufig auf Grund seines invasiven Charakters und komplexen Versuchsaufbaus. Ziel des Projekts ist die Entwicklung eines Systems, dass Körperfunktionen überwacht und diese auswertet, ohne den Fahrer zu beeinträchtigen. Weiterhin wird die Möglichkeit einer einfachen Portierung der Anwendung vom Simulator in ein echtes Fahrzeug geprüft. Das System soll eigenständig Müdigkeit erkennen oder</a:t>
-            </a:r>
-            <a:endParaRPr/>
-          </a:p>
-          <a:p>
-            <a:r>
-              <a:rPr lang="de-DE" sz="1200">
-                <a:solidFill>
-                  <a:srgbClr val="000000"/>
-                </a:solidFill>
-                <a:latin typeface="Calibri"/>
-              </a:rPr>
-              <a:t>zur Validierung / Verbesserung bestehender Systeme verwendet werden können.</a:t>
-            </a:r>
-            <a:endParaRPr/>
-          </a:p>
-        </p:txBody>
       </p:sp>
       <p:pic>
         <p:nvPicPr>
-          <p:cNvPr id="46" name="" descr=""/>
+          <p:cNvPr id="43" name="" descr=""/>
           <p:cNvPicPr/>
           <p:nvPr/>
         </p:nvPicPr>
         <p:blipFill>
-          <a:blip r:embed="rId3"/>
+          <a:blip r:embed="rId2"/>
           <a:stretch>
             <a:fillRect/>
           </a:stretch>
         </p:blipFill>
         <p:spPr>
           <a:xfrm>
-            <a:off x="4533480" y="1872000"/>
-            <a:ext cx="4250520" cy="2376000"/>
+            <a:off x="648000" y="1840680"/>
+            <a:ext cx="7919640" cy="4426560"/>
           </a:xfrm>
           <a:prstGeom prst="rect">
             <a:avLst/>
@@ -1927,135 +1611,28 @@
       </p:pic>
       <p:sp>
         <p:nvSpPr>
-          <p:cNvPr id="47" name="TextShape 3"/>
-          <p:cNvSpPr txBox="1"/>
+          <p:cNvPr id="44" name="CustomShape 3"/>
+          <p:cNvSpPr/>
           <p:nvPr/>
         </p:nvSpPr>
         <p:spPr>
           <a:xfrm>
             <a:off x="5400000" y="5371200"/>
-            <a:ext cx="3384000" cy="964800"/>
-          </a:xfrm>
-          <a:prstGeom prst="rect">
-            <a:avLst/>
-          </a:prstGeom>
-        </p:spPr>
-        <p:txBody>
-          <a:bodyPr lIns="90000" rIns="90000" tIns="45000" bIns="45000"/>
-          <a:p>
-            <a:r>
-              <a:rPr lang="de-DE" sz="800">
-                <a:latin typeface="Calibri"/>
-              </a:rPr>
-              <a:t>[MAA15] </a:t>
-            </a:r>
-            <a:r>
-              <a:rPr lang="de-DE" sz="800">
-                <a:latin typeface="Calibri"/>
-              </a:rPr>
-              <a:t>	</a:t>
-            </a:r>
-            <a:r>
-              <a:rPr lang="de-DE" sz="800">
-                <a:latin typeface="Calibri"/>
-              </a:rPr>
-              <a:t>Xavier Mosquet, Michelle Andersen and and Aakash Arora. „A road</a:t>
-            </a:r>
-            <a:endParaRPr/>
-          </a:p>
-          <a:p>
-            <a:r>
-              <a:rPr lang="de-DE" sz="800">
-                <a:latin typeface="Calibri"/>
-              </a:rPr>
-              <a:t>	</a:t>
-            </a:r>
-            <a:r>
-              <a:rPr lang="de-DE" sz="800">
-                <a:latin typeface="Calibri"/>
-              </a:rPr>
-              <a:t>map to safer driving through advanced driver assistance systems.“</a:t>
-            </a:r>
-            <a:endParaRPr/>
-          </a:p>
-          <a:p>
-            <a:r>
-              <a:rPr lang="de-DE" sz="800">
-                <a:latin typeface="Calibri"/>
-              </a:rPr>
-              <a:t>[Eve08]</a:t>
-            </a:r>
-            <a:r>
-              <a:rPr lang="de-DE" sz="800">
-                <a:latin typeface="Calibri"/>
-              </a:rPr>
-              <a:t>	</a:t>
-            </a:r>
-            <a:r>
-              <a:rPr lang="de-DE" sz="800">
-                <a:latin typeface="Calibri"/>
-              </a:rPr>
-              <a:t>Claudia Evers. „Unterschätzte Risikofaktoren Übermüdung und</a:t>
-            </a:r>
-            <a:endParaRPr/>
-          </a:p>
-          <a:p>
-            <a:r>
-              <a:rPr lang="de-DE" sz="800">
-                <a:latin typeface="Calibri"/>
-              </a:rPr>
-              <a:t>	</a:t>
-            </a:r>
-            <a:r>
-              <a:rPr lang="de-DE" sz="800">
-                <a:latin typeface="Calibri"/>
-              </a:rPr>
-              <a:t>Ablenkung als Ursachen für schwere LKW-Unfälle.“</a:t>
-            </a:r>
-            <a:endParaRPr/>
-          </a:p>
-          <a:p>
-            <a:r>
-              <a:rPr lang="de-DE" sz="800">
-                <a:latin typeface="Calibri"/>
-              </a:rPr>
-              <a:t>[NSF10] </a:t>
-            </a:r>
-            <a:r>
-              <a:rPr lang="de-DE" sz="800">
-                <a:latin typeface="Calibri"/>
-              </a:rPr>
-              <a:t>	</a:t>
-            </a:r>
-            <a:r>
-              <a:rPr lang="de-DE" sz="800">
-                <a:latin typeface="Calibri"/>
-              </a:rPr>
-              <a:t>National Sleep Foundation. „Drivers Beware: getting enough sleep</a:t>
-            </a:r>
-            <a:endParaRPr/>
-          </a:p>
-          <a:p>
-            <a:r>
-              <a:rPr lang="de-DE" sz="800">
-                <a:latin typeface="Calibri"/>
-              </a:rPr>
-              <a:t>	</a:t>
-            </a:r>
-            <a:r>
-              <a:rPr lang="de-DE" sz="800">
-                <a:latin typeface="Calibri"/>
-              </a:rPr>
-              <a:t>can save your life this memorial day.“</a:t>
-            </a:r>
-            <a:endParaRPr/>
-          </a:p>
-        </p:txBody>
+            <a:ext cx="3383640" cy="964440"/>
+          </a:xfrm>
+          <a:prstGeom prst="rect">
+            <a:avLst/>
+          </a:prstGeom>
+          <a:noFill/>
+          <a:ln>
+            <a:noFill/>
+          </a:ln>
+        </p:spPr>
       </p:sp>
     </p:spTree>
   </p:cSld>
   <p:transition spd="slow" advTm="30000">
-    <p:push dir="d"/>
+    <p:push dir="u"/>
   </p:transition>
   <p:timing>
     <p:tnLst>
@@ -2064,6 +1641,531 @@
           <p:childTnLst>
             <p:seq>
               <p:cTn id="2" nodeType="mainSeq"/>
+              <p:prevCondLst>
+                <p:cond delay="0" evt="onPrev">
+                  <p:tgtEl>
+                    <p:sldTgt/>
+                  </p:tgtEl>
+                </p:cond>
+              </p:prevCondLst>
+              <p:nextCondLst>
+                <p:cond delay="0" evt="onNext">
+                  <p:tgtEl>
+                    <p:sldTgt/>
+                  </p:tgtEl>
+                </p:cond>
+              </p:nextCondLst>
+            </p:seq>
+          </p:childTnLst>
+        </p:cTn>
+      </p:par>
+    </p:tnLst>
+  </p:timing>
+</p:sld>
+</file>
+
+<file path=ppt/slides/slide2.xml><?xml version="1.0" encoding="utf-8"?>
+<p:sld xmlns:a="http://schemas.openxmlformats.org/drawingml/2006/main" xmlns:p="http://schemas.openxmlformats.org/presentationml/2006/main" xmlns:r="http://schemas.openxmlformats.org/officeDocument/2006/relationships">
+  <p:cSld>
+    <p:spTree>
+      <p:nvGrpSpPr>
+        <p:cNvPr id="1" name=""/>
+        <p:cNvGrpSpPr/>
+        <p:nvPr/>
+      </p:nvGrpSpPr>
+      <p:grpSpPr>
+        <a:xfrm>
+          <a:off x="0" y="0"/>
+          <a:ext cx="0" cy="0"/>
+          <a:chOff x="0" y="0"/>
+          <a:chExt cx="0" cy="0"/>
+        </a:xfrm>
+      </p:grpSpPr>
+      <p:pic>
+        <p:nvPicPr>
+          <p:cNvPr id="45" name="Bild 9" descr=""/>
+          <p:cNvPicPr/>
+          <p:nvPr/>
+        </p:nvPicPr>
+        <p:blipFill>
+          <a:blip r:embed="rId1"/>
+          <a:stretch>
+            <a:fillRect/>
+          </a:stretch>
+        </p:blipFill>
+        <p:spPr>
+          <a:xfrm>
+            <a:off x="179280" y="82800"/>
+            <a:ext cx="4966200" cy="6184440"/>
+          </a:xfrm>
+          <a:prstGeom prst="rect">
+            <a:avLst/>
+          </a:prstGeom>
+          <a:ln>
+            <a:noFill/>
+          </a:ln>
+        </p:spPr>
+      </p:pic>
+      <p:sp>
+        <p:nvSpPr>
+          <p:cNvPr id="46" name="CustomShape 1"/>
+          <p:cNvSpPr/>
+          <p:nvPr/>
+        </p:nvSpPr>
+        <p:spPr>
+          <a:xfrm>
+            <a:off x="102600" y="1099800"/>
+            <a:ext cx="8818920" cy="628200"/>
+          </a:xfrm>
+          <a:prstGeom prst="rect">
+            <a:avLst/>
+          </a:prstGeom>
+          <a:noFill/>
+          <a:ln>
+            <a:noFill/>
+          </a:ln>
+        </p:spPr>
+        <p:txBody>
+          <a:bodyPr wrap="none" lIns="90000" rIns="90000" tIns="45000" bIns="45000"/>
+          <a:p>
+            <a:r>
+              <a:rPr lang="de-DE" sz="3200">
+                <a:solidFill>
+                  <a:srgbClr val="000000"/>
+                </a:solidFill>
+                <a:latin typeface="Corbel"/>
+              </a:rPr>
+              <a:t>Geplante Ergebnisse Meilenstein 1 (Januar)</a:t>
+            </a:r>
+            <a:endParaRPr/>
+          </a:p>
+        </p:txBody>
+      </p:sp>
+      <p:sp>
+        <p:nvSpPr>
+          <p:cNvPr id="47" name="CustomShape 2"/>
+          <p:cNvSpPr/>
+          <p:nvPr/>
+        </p:nvSpPr>
+        <p:spPr>
+          <a:xfrm>
+            <a:off x="192600" y="1815840"/>
+            <a:ext cx="4348800" cy="3740400"/>
+          </a:xfrm>
+          <a:prstGeom prst="rect">
+            <a:avLst/>
+          </a:prstGeom>
+          <a:noFill/>
+          <a:ln>
+            <a:noFill/>
+          </a:ln>
+        </p:spPr>
+      </p:sp>
+      <p:sp>
+        <p:nvSpPr>
+          <p:cNvPr id="48" name="CustomShape 3"/>
+          <p:cNvSpPr/>
+          <p:nvPr/>
+        </p:nvSpPr>
+        <p:spPr>
+          <a:xfrm>
+            <a:off x="5400000" y="5371200"/>
+            <a:ext cx="3383640" cy="964440"/>
+          </a:xfrm>
+          <a:prstGeom prst="rect">
+            <a:avLst/>
+          </a:prstGeom>
+          <a:noFill/>
+          <a:ln>
+            <a:noFill/>
+          </a:ln>
+        </p:spPr>
+      </p:sp>
+      <p:sp>
+        <p:nvSpPr>
+          <p:cNvPr id="49" name="TextShape 4"/>
+          <p:cNvSpPr txBox="1"/>
+          <p:nvPr/>
+        </p:nvSpPr>
+        <p:spPr>
+          <a:xfrm>
+            <a:off x="648000" y="1872000"/>
+            <a:ext cx="7992000" cy="1882080"/>
+          </a:xfrm>
+          <a:prstGeom prst="rect">
+            <a:avLst/>
+          </a:prstGeom>
+        </p:spPr>
+        <p:txBody>
+          <a:bodyPr lIns="90000" rIns="90000" tIns="45000" bIns="45000"/>
+          <a:p>
+            <a:endParaRPr/>
+          </a:p>
+          <a:p>
+            <a:pPr>
+              <a:buSzPct val="45000"/>
+              <a:buFont typeface="StarSymbol"/>
+              <a:buChar char=""/>
+            </a:pPr>
+            <a:r>
+              <a:rPr lang="de-DE">
+                <a:latin typeface="Arial"/>
+              </a:rPr>
+              <a:t>Integration des EEG und des EKG Brustbandes </a:t>
+            </a:r>
+            <a:r>
+              <a:rPr lang="de-DE">
+                <a:latin typeface="Arial"/>
+              </a:rPr>
+              <a:t>
+</a:t>
+            </a:r>
+            <a:r>
+              <a:rPr lang="de-DE">
+                <a:latin typeface="Arial"/>
+              </a:rPr>
+              <a:t>ins Simulationsumfeld des IoT</a:t>
+            </a:r>
+            <a:r>
+              <a:rPr lang="de-DE">
+                <a:latin typeface="Arial"/>
+              </a:rPr>
+              <a:t>
+</a:t>
+            </a:r>
+            <a:endParaRPr/>
+          </a:p>
+          <a:p>
+            <a:pPr>
+              <a:buSzPct val="45000"/>
+              <a:buFont typeface="StarSymbol"/>
+              <a:buChar char=""/>
+            </a:pPr>
+            <a:r>
+              <a:rPr lang="de-DE">
+                <a:latin typeface="Arial"/>
+              </a:rPr>
+              <a:t>Application-Skeleton das EEG-Daten vom Simulator empfangen kann</a:t>
+            </a:r>
+            <a:r>
+              <a:rPr lang="de-DE">
+                <a:latin typeface="Arial"/>
+              </a:rPr>
+              <a:t>
+</a:t>
+            </a:r>
+            <a:endParaRPr/>
+          </a:p>
+          <a:p>
+            <a:pPr>
+              <a:buSzPct val="45000"/>
+              <a:buFont typeface="StarSymbol"/>
+              <a:buChar char=""/>
+            </a:pPr>
+            <a:r>
+              <a:rPr lang="de-DE">
+                <a:latin typeface="Arial"/>
+              </a:rPr>
+              <a:t>Szenarios für die Aufnahme von Testfahrten</a:t>
+            </a:r>
+            <a:endParaRPr/>
+          </a:p>
+        </p:txBody>
+      </p:sp>
+    </p:spTree>
+  </p:cSld>
+  <p:transition spd="slow" advTm="30000">
+    <p:push dir="u"/>
+  </p:transition>
+  <p:timing>
+    <p:tnLst>
+      <p:par>
+        <p:cTn id="3" dur="indefinite" restart="never" nodeType="tmRoot">
+          <p:childTnLst>
+            <p:seq>
+              <p:cTn id="4" nodeType="mainSeq"/>
+              <p:prevCondLst>
+                <p:cond delay="0" evt="onPrev">
+                  <p:tgtEl>
+                    <p:sldTgt/>
+                  </p:tgtEl>
+                </p:cond>
+              </p:prevCondLst>
+              <p:nextCondLst>
+                <p:cond delay="0" evt="onNext">
+                  <p:tgtEl>
+                    <p:sldTgt/>
+                  </p:tgtEl>
+                </p:cond>
+              </p:nextCondLst>
+            </p:seq>
+          </p:childTnLst>
+        </p:cTn>
+      </p:par>
+    </p:tnLst>
+  </p:timing>
+</p:sld>
+</file>
+
+<file path=ppt/slides/slide3.xml><?xml version="1.0" encoding="utf-8"?>
+<p:sld xmlns:a="http://schemas.openxmlformats.org/drawingml/2006/main" xmlns:p="http://schemas.openxmlformats.org/presentationml/2006/main" xmlns:r="http://schemas.openxmlformats.org/officeDocument/2006/relationships">
+  <p:cSld>
+    <p:spTree>
+      <p:nvGrpSpPr>
+        <p:cNvPr id="1" name=""/>
+        <p:cNvGrpSpPr/>
+        <p:nvPr/>
+      </p:nvGrpSpPr>
+      <p:grpSpPr>
+        <a:xfrm>
+          <a:off x="0" y="0"/>
+          <a:ext cx="0" cy="0"/>
+          <a:chOff x="0" y="0"/>
+          <a:chExt cx="0" cy="0"/>
+        </a:xfrm>
+      </p:grpSpPr>
+      <p:pic>
+        <p:nvPicPr>
+          <p:cNvPr id="50" name="Bild 9" descr=""/>
+          <p:cNvPicPr/>
+          <p:nvPr/>
+        </p:nvPicPr>
+        <p:blipFill>
+          <a:blip r:embed="rId1"/>
+          <a:stretch>
+            <a:fillRect/>
+          </a:stretch>
+        </p:blipFill>
+        <p:spPr>
+          <a:xfrm>
+            <a:off x="179280" y="82800"/>
+            <a:ext cx="4966200" cy="6184440"/>
+          </a:xfrm>
+          <a:prstGeom prst="rect">
+            <a:avLst/>
+          </a:prstGeom>
+          <a:ln>
+            <a:noFill/>
+          </a:ln>
+        </p:spPr>
+      </p:pic>
+      <p:sp>
+        <p:nvSpPr>
+          <p:cNvPr id="51" name="CustomShape 1"/>
+          <p:cNvSpPr/>
+          <p:nvPr/>
+        </p:nvSpPr>
+        <p:spPr>
+          <a:xfrm>
+            <a:off x="102600" y="1099800"/>
+            <a:ext cx="8818920" cy="628200"/>
+          </a:xfrm>
+          <a:prstGeom prst="rect">
+            <a:avLst/>
+          </a:prstGeom>
+          <a:noFill/>
+          <a:ln>
+            <a:noFill/>
+          </a:ln>
+        </p:spPr>
+        <p:txBody>
+          <a:bodyPr wrap="none" lIns="90000" rIns="90000" tIns="45000" bIns="45000"/>
+          <a:p>
+            <a:r>
+              <a:rPr lang="de-DE" sz="3200">
+                <a:solidFill>
+                  <a:srgbClr val="000000"/>
+                </a:solidFill>
+                <a:latin typeface="Corbel"/>
+              </a:rPr>
+              <a:t>Derzeitiger Stand</a:t>
+            </a:r>
+            <a:endParaRPr/>
+          </a:p>
+        </p:txBody>
+      </p:sp>
+      <p:sp>
+        <p:nvSpPr>
+          <p:cNvPr id="52" name="CustomShape 2"/>
+          <p:cNvSpPr/>
+          <p:nvPr/>
+        </p:nvSpPr>
+        <p:spPr>
+          <a:xfrm>
+            <a:off x="192600" y="1815840"/>
+            <a:ext cx="4348800" cy="3740400"/>
+          </a:xfrm>
+          <a:prstGeom prst="rect">
+            <a:avLst/>
+          </a:prstGeom>
+          <a:noFill/>
+          <a:ln>
+            <a:noFill/>
+          </a:ln>
+        </p:spPr>
+      </p:sp>
+      <p:sp>
+        <p:nvSpPr>
+          <p:cNvPr id="53" name="CustomShape 3"/>
+          <p:cNvSpPr/>
+          <p:nvPr/>
+        </p:nvSpPr>
+        <p:spPr>
+          <a:xfrm>
+            <a:off x="5400000" y="5371200"/>
+            <a:ext cx="3383640" cy="964440"/>
+          </a:xfrm>
+          <a:prstGeom prst="rect">
+            <a:avLst/>
+          </a:prstGeom>
+          <a:noFill/>
+          <a:ln>
+            <a:noFill/>
+          </a:ln>
+        </p:spPr>
+      </p:sp>
+      <p:sp>
+        <p:nvSpPr>
+          <p:cNvPr id="54" name="TextShape 4"/>
+          <p:cNvSpPr txBox="1"/>
+          <p:nvPr/>
+        </p:nvSpPr>
+        <p:spPr>
+          <a:xfrm>
+            <a:off x="648000" y="1872000"/>
+            <a:ext cx="7992000" cy="2394000"/>
+          </a:xfrm>
+          <a:prstGeom prst="rect">
+            <a:avLst/>
+          </a:prstGeom>
+        </p:spPr>
+        <p:txBody>
+          <a:bodyPr lIns="90000" rIns="90000" tIns="45000" bIns="45000"/>
+          <a:p>
+            <a:pPr>
+              <a:buSzPct val="45000"/>
+              <a:buFont typeface="StarSymbol"/>
+              <a:buChar char=""/>
+            </a:pPr>
+            <a:r>
+              <a:rPr lang="de-DE">
+                <a:latin typeface="Arial"/>
+              </a:rPr>
+              <a:t>Einarbeitung ins Simulationsumfeld des IoT</a:t>
+            </a:r>
+            <a:r>
+              <a:rPr lang="de-DE">
+                <a:latin typeface="Arial"/>
+              </a:rPr>
+              <a:t>
+</a:t>
+            </a:r>
+            <a:endParaRPr/>
+          </a:p>
+          <a:p>
+            <a:pPr>
+              <a:buSzPct val="45000"/>
+              <a:buFont typeface="StarSymbol"/>
+              <a:buChar char=""/>
+            </a:pPr>
+            <a:r>
+              <a:rPr lang="de-DE">
+                <a:latin typeface="Arial"/>
+              </a:rPr>
+              <a:t>Integration des EEG in die Applikation, um die Signale </a:t>
+            </a:r>
+            <a:r>
+              <a:rPr lang="de-DE">
+                <a:latin typeface="Arial"/>
+              </a:rPr>
+              <a:t>
+</a:t>
+            </a:r>
+            <a:r>
+              <a:rPr lang="de-DE">
+                <a:latin typeface="Arial"/>
+              </a:rPr>
+              <a:t>via CAN-Interface (Simuliertes Steuergerät) zu übertragen.</a:t>
+            </a:r>
+            <a:r>
+              <a:rPr lang="de-DE">
+                <a:latin typeface="Arial"/>
+              </a:rPr>
+              <a:t>
+</a:t>
+            </a:r>
+            <a:endParaRPr/>
+          </a:p>
+          <a:p>
+            <a:pPr>
+              <a:buSzPct val="45000"/>
+              <a:buFont typeface="StarSymbol"/>
+              <a:buChar char=""/>
+            </a:pPr>
+            <a:r>
+              <a:rPr lang="de-DE">
+                <a:latin typeface="Arial"/>
+              </a:rPr>
+              <a:t>Literaturrecherche</a:t>
+            </a:r>
+            <a:endParaRPr/>
+          </a:p>
+          <a:p>
+            <a:pPr lvl="1">
+              <a:buSzPct val="45000"/>
+              <a:buFont typeface="StarSymbol"/>
+              <a:buChar char=""/>
+            </a:pPr>
+            <a:r>
+              <a:rPr lang="de-DE">
+                <a:latin typeface="Arial"/>
+              </a:rPr>
+              <a:t>Definition von Müdigkeit</a:t>
+            </a:r>
+            <a:endParaRPr/>
+          </a:p>
+          <a:p>
+            <a:pPr lvl="1">
+              <a:buSzPct val="45000"/>
+              <a:buFont typeface="StarSymbol"/>
+              <a:buChar char=""/>
+            </a:pPr>
+            <a:r>
+              <a:rPr lang="de-DE">
+                <a:latin typeface="Arial"/>
+              </a:rPr>
+              <a:t>Testbedingungen. um die Chance auf Müdigkeit zu erhöhen</a:t>
+            </a:r>
+            <a:endParaRPr/>
+          </a:p>
+          <a:p>
+            <a:pPr lvl="1">
+              <a:buSzPct val="45000"/>
+              <a:buFont typeface="StarSymbol"/>
+              <a:buChar char=""/>
+            </a:pPr>
+            <a:r>
+              <a:rPr lang="de-DE">
+                <a:latin typeface="Arial"/>
+              </a:rPr>
+              <a:t>EKG-Merkmale die auf Müdigkeit hinweisen</a:t>
+            </a:r>
+            <a:endParaRPr/>
+          </a:p>
+        </p:txBody>
+      </p:sp>
+    </p:spTree>
+  </p:cSld>
+  <p:transition spd="slow" advTm="30000">
+    <p:push dir="u"/>
+  </p:transition>
+  <p:timing>
+    <p:tnLst>
+      <p:par>
+        <p:cTn id="5" dur="indefinite" restart="never" nodeType="tmRoot">
+          <p:childTnLst>
+            <p:seq>
+              <p:cTn id="6" nodeType="mainSeq"/>
               <p:prevCondLst>
                 <p:cond delay="0" evt="onPrev">
                   <p:tgtEl>

</xml_diff>